<commit_message>
updated versions after Mitch's dunday's meeting
</commit_message>
<xml_diff>
--- a/Slides/Lesson 5.2 Evaluating Tests.pptx
+++ b/Slides/Lesson 5.2 Evaluating Tests.pptx
@@ -2410,7 +2410,7 @@
           <a:p>
             <a:fld id="{7C7E5181-6CF5-45F7-A87A-E0E0B1FD7549}" type="datetimeFigureOut">
               <a:rPr lang="en-US" smtClean="0"/>
-              <a:t>2/12/2022</a:t>
+              <a:t>2/13/2022</a:t>
             </a:fld>
             <a:endParaRPr lang="en-US"/>
           </a:p>
@@ -3995,7 +3995,7 @@
           <a:p>
             <a:fld id="{5D2A64DE-480B-420F-9649-4F8E696E08E0}" type="datetime1">
               <a:rPr lang="en-US" smtClean="0"/>
-              <a:t>2/12/2022</a:t>
+              <a:t>2/13/2022</a:t>
             </a:fld>
             <a:endParaRPr lang="en-US"/>
           </a:p>
@@ -4229,7 +4229,7 @@
           <a:p>
             <a:fld id="{0D3616D0-8311-4107-9726-6B805E7D05BA}" type="datetime1">
               <a:rPr lang="en-US" smtClean="0"/>
-              <a:t>2/12/2022</a:t>
+              <a:t>2/13/2022</a:t>
             </a:fld>
             <a:endParaRPr lang="en-US"/>
           </a:p>
@@ -4437,7 +4437,7 @@
           <a:p>
             <a:fld id="{3BC2557A-5C88-417A-A763-5AC779462A5F}" type="datetime1">
               <a:rPr lang="en-US" smtClean="0"/>
-              <a:t>2/12/2022</a:t>
+              <a:t>2/13/2022</a:t>
             </a:fld>
             <a:endParaRPr lang="en-US"/>
           </a:p>
@@ -6123,7 +6123,7 @@
           <a:p>
             <a:fld id="{07C7BFD4-467E-4EDE-93EA-052F5B39A4E5}" type="datetime1">
               <a:rPr lang="en-US" smtClean="0"/>
-              <a:t>2/12/2022</a:t>
+              <a:t>2/13/2022</a:t>
             </a:fld>
             <a:endParaRPr lang="en-US"/>
           </a:p>
@@ -7885,7 +7885,7 @@
           <a:p>
             <a:fld id="{A533CBE2-D5BE-47AC-ADC2-9CDFC1D0CF90}" type="datetime1">
               <a:rPr lang="en-US" smtClean="0"/>
-              <a:t>2/12/2022</a:t>
+              <a:t>2/13/2022</a:t>
             </a:fld>
             <a:endParaRPr lang="en-US"/>
           </a:p>
@@ -8188,7 +8188,7 @@
           <a:p>
             <a:fld id="{39B7EDB1-CE74-4951-85A2-0B01C2128E28}" type="datetime1">
               <a:rPr lang="en-US" smtClean="0"/>
-              <a:t>2/12/2022</a:t>
+              <a:t>2/13/2022</a:t>
             </a:fld>
             <a:endParaRPr lang="en-US"/>
           </a:p>
@@ -8637,7 +8637,7 @@
           <a:p>
             <a:fld id="{2BC7EB92-A5C2-4807-A9DC-9EDE6CBFB241}" type="datetime1">
               <a:rPr lang="en-US" smtClean="0"/>
-              <a:t>2/12/2022</a:t>
+              <a:t>2/13/2022</a:t>
             </a:fld>
             <a:endParaRPr lang="en-US"/>
           </a:p>
@@ -8784,7 +8784,7 @@
           <a:p>
             <a:fld id="{109E55A0-C911-4F03-82FC-7E5926047D46}" type="datetime1">
               <a:rPr lang="en-US" smtClean="0"/>
-              <a:t>2/12/2022</a:t>
+              <a:t>2/13/2022</a:t>
             </a:fld>
             <a:endParaRPr lang="en-US"/>
           </a:p>
@@ -8933,7 +8933,7 @@
           <a:p>
             <a:fld id="{2B7B7EE0-7771-4CD5-9B2B-3550753A54A1}" type="datetime1">
               <a:rPr lang="en-US" smtClean="0"/>
-              <a:t>2/12/2022</a:t>
+              <a:t>2/13/2022</a:t>
             </a:fld>
             <a:endParaRPr lang="en-US"/>
           </a:p>
@@ -9244,7 +9244,7 @@
           <a:p>
             <a:fld id="{F8B318B3-0E87-4416-A9B8-D891968C2727}" type="datetime1">
               <a:rPr lang="en-US" smtClean="0"/>
-              <a:t>2/12/2022</a:t>
+              <a:t>2/13/2022</a:t>
             </a:fld>
             <a:endParaRPr lang="en-US"/>
           </a:p>
@@ -9535,7 +9535,7 @@
           <a:p>
             <a:fld id="{EA476A42-A091-4468-A075-64A31BE59948}" type="datetime1">
               <a:rPr lang="en-US" smtClean="0"/>
-              <a:t>2/12/2022</a:t>
+              <a:t>2/13/2022</a:t>
             </a:fld>
             <a:endParaRPr lang="en-US"/>
           </a:p>
@@ -9778,7 +9778,7 @@
           <a:p>
             <a:fld id="{54D997E8-DDEE-43F1-8D9B-F8A1E11DE488}" type="datetime1">
               <a:rPr lang="en-US" smtClean="0"/>
-              <a:t>2/12/2022</a:t>
+              <a:t>2/13/2022</a:t>
             </a:fld>
             <a:endParaRPr lang="en-US"/>
           </a:p>
@@ -13445,27 +13445,20 @@
           <a:p>
             <a:r>
               <a:rPr lang="en-US" dirty="0"/>
-              <a:t>Coverage is computed automatically while the program executes</a:t>
+              <a:t>Coverage is computed automatically while the tests execute</a:t>
             </a:r>
           </a:p>
           <a:p>
             <a:r>
               <a:rPr lang="en-US" dirty="0"/>
-              <a:t>The Istanbul/NYC tool measure code coverage for TypeScript programs</a:t>
+              <a:t>jest --coverage </a:t>
             </a:r>
           </a:p>
           <a:p>
             <a:pPr lvl="1"/>
             <a:r>
               <a:rPr lang="en-US" dirty="0"/>
-              <a:t>supports several coverage criteria (statements, branches, lines, functions)</a:t>
-            </a:r>
-          </a:p>
-          <a:p>
-            <a:pPr lvl="1"/>
-            <a:r>
-              <a:rPr lang="en-US" dirty="0"/>
-              <a:t>integrates with Mocha</a:t>
+              <a:t>Does it all for you</a:t>
             </a:r>
           </a:p>
         </p:txBody>
@@ -13513,8 +13506,8 @@
         </p:nvGrpSpPr>
         <p:grpSpPr>
           <a:xfrm>
-            <a:off x="6096000" y="3751557"/>
-            <a:ext cx="5256536" cy="2667850"/>
+            <a:off x="4546600" y="2565254"/>
+            <a:ext cx="6807200" cy="3581545"/>
             <a:chOff x="0" y="0"/>
             <a:chExt cx="7475960" cy="3794273"/>
           </a:xfrm>
@@ -13599,7 +13592,7 @@
         </p:nvSpPr>
         <p:spPr>
           <a:xfrm>
-            <a:off x="5280024" y="6454542"/>
+            <a:off x="4352924" y="6118109"/>
             <a:ext cx="6655220" cy="266933"/>
           </a:xfrm>
           <a:prstGeom prst="rect">
@@ -13628,7 +13621,7 @@
               <a:defRPr sz="1800"/>
             </a:pPr>
             <a:r>
-              <a:rPr sz="1266"/>
+              <a:rPr sz="1266" dirty="0"/>
               <a:t>*see example at https://github.com/philipbeel/example-typescript-nyc-mocha-coverage</a:t>
             </a:r>
           </a:p>
@@ -41099,7 +41092,7 @@
           <a:p>
             <a:r>
               <a:rPr lang="en-US" dirty="0"/>
-              <a:t>Structural Test Criteria</a:t>
+              <a:t>There are many other ways to judge the Adequacy of Structural Tests</a:t>
             </a:r>
           </a:p>
         </p:txBody>
@@ -41134,20 +41127,6 @@
             <a:r>
               <a:rPr lang="en-US" dirty="0"/>
               <a:t>Path coverage (usually impossible) </a:t>
-            </a:r>
-            <a:r>
-              <a:rPr lang="en-US" i="1" dirty="0"/>
-              <a:t>implies</a:t>
-            </a:r>
-          </a:p>
-          <a:p>
-            <a:pPr marL="514350" indent="-514350">
-              <a:buFont typeface="+mj-lt"/>
-              <a:buAutoNum type="arabicPeriod"/>
-            </a:pPr>
-            <a:r>
-              <a:rPr lang="en-US" dirty="0"/>
-              <a:t>Repetition-Free Path Coverage </a:t>
             </a:r>
             <a:r>
               <a:rPr lang="en-US" i="1" dirty="0"/>
@@ -41393,7 +41372,7 @@
             <a:pPr lvl="2"/>
             <a:r>
               <a:rPr lang="en-US" dirty="0"/>
-              <a:t>E.g., Users may assume that a hash result is non-negative;</a:t>
+              <a:t>e.g., Users may assume that a hash result is non-negative;</a:t>
             </a:r>
           </a:p>
           <a:p>
@@ -44447,7 +44426,7 @@
               <a:buNone/>
             </a:pPr>
             <a:r>
-              <a:rPr lang="en-US" sz="1800" b="0" dirty="0">
+              <a:rPr lang="en-US" sz="1600" b="0" dirty="0">
                 <a:solidFill>
                   <a:srgbClr val="000000"/>
                 </a:solidFill>
@@ -44457,7 +44436,7 @@
               <a:t>it(‘removes max’, ()</a:t>
             </a:r>
             <a:r>
-              <a:rPr lang="en-US" sz="1800" b="0" dirty="0">
+              <a:rPr lang="en-US" sz="1600" b="0" dirty="0">
                 <a:solidFill>
                   <a:srgbClr val="0000FF"/>
                 </a:solidFill>
@@ -44467,7 +44446,7 @@
               <a:t>=&gt;</a:t>
             </a:r>
             <a:r>
-              <a:rPr lang="en-US" sz="1800" b="0" dirty="0">
+              <a:rPr lang="en-US" sz="1600" b="0" dirty="0">
                 <a:solidFill>
                   <a:srgbClr val="000000"/>
                 </a:solidFill>
@@ -44482,7 +44461,7 @@
               <a:buNone/>
             </a:pPr>
             <a:r>
-              <a:rPr lang="en-US" sz="1800" b="0" dirty="0">
+              <a:rPr lang="en-US" sz="1600" b="0" dirty="0">
                 <a:solidFill>
                   <a:srgbClr val="000000"/>
                 </a:solidFill>
@@ -44492,7 +44471,7 @@
               <a:t>    </a:t>
             </a:r>
             <a:r>
-              <a:rPr lang="en-US" sz="1800" b="0" dirty="0" err="1">
+              <a:rPr lang="en-US" sz="1600" b="0" dirty="0" err="1">
                 <a:solidFill>
                   <a:srgbClr val="000000"/>
                 </a:solidFill>
@@ -44502,7 +44481,7 @@
               <a:t>tree.remove</a:t>
             </a:r>
             <a:r>
-              <a:rPr lang="en-US" sz="1800" b="0" dirty="0">
+              <a:rPr lang="en-US" sz="1600" b="0" dirty="0">
                 <a:solidFill>
                   <a:srgbClr val="000000"/>
                 </a:solidFill>
@@ -44512,7 +44491,7 @@
               <a:t>(</a:t>
             </a:r>
             <a:r>
-              <a:rPr lang="en-US" sz="1800" b="0" dirty="0">
+              <a:rPr lang="en-US" sz="1600" b="0" dirty="0">
                 <a:solidFill>
                   <a:srgbClr val="098658"/>
                 </a:solidFill>
@@ -44522,7 +44501,7 @@
               <a:t>31</a:t>
             </a:r>
             <a:r>
-              <a:rPr lang="en-US" sz="1800" b="0" dirty="0">
+              <a:rPr lang="en-US" sz="1600" b="0" dirty="0">
                 <a:solidFill>
                   <a:srgbClr val="000000"/>
                 </a:solidFill>
@@ -44537,7 +44516,7 @@
               <a:buNone/>
             </a:pPr>
             <a:r>
-              <a:rPr lang="en-US" sz="1800" b="0" dirty="0">
+              <a:rPr lang="en-US" sz="1600" b="0" dirty="0">
                 <a:solidFill>
                   <a:srgbClr val="000000"/>
                 </a:solidFill>
@@ -44547,7 +44526,7 @@
               <a:t>    expect(</a:t>
             </a:r>
             <a:r>
-              <a:rPr lang="en-US" sz="1800" b="0" dirty="0" err="1">
+              <a:rPr lang="en-US" sz="1600" b="0" dirty="0" err="1">
                 <a:solidFill>
                   <a:srgbClr val="000000"/>
                 </a:solidFill>
@@ -44557,7 +44536,7 @@
               <a:t>tree.size</a:t>
             </a:r>
             <a:r>
-              <a:rPr lang="en-US" sz="1800" b="0" dirty="0">
+              <a:rPr lang="en-US" sz="1600" b="0" dirty="0">
                 <a:solidFill>
                   <a:srgbClr val="000000"/>
                 </a:solidFill>
@@ -44572,7 +44551,7 @@
               <a:buNone/>
             </a:pPr>
             <a:r>
-              <a:rPr lang="en-US" sz="1800" b="0" dirty="0">
+              <a:rPr lang="en-US" sz="1600" b="0" dirty="0">
                 <a:solidFill>
                   <a:srgbClr val="000000"/>
                 </a:solidFill>
@@ -44582,7 +44561,7 @@
               <a:t>      </a:t>
             </a:r>
             <a:r>
-              <a:rPr lang="en-US" sz="1800" b="0" dirty="0" err="1">
+              <a:rPr lang="en-US" sz="1600" b="0" dirty="0" err="1">
                 <a:solidFill>
                   <a:srgbClr val="000000"/>
                 </a:solidFill>
@@ -44592,7 +44571,7 @@
               <a:t>toBe</a:t>
             </a:r>
             <a:r>
-              <a:rPr lang="en-US" sz="1800" b="0" dirty="0">
+              <a:rPr lang="en-US" sz="1600" b="0" dirty="0">
                 <a:solidFill>
                   <a:srgbClr val="000000"/>
                 </a:solidFill>
@@ -44602,7 +44581,7 @@
               <a:t>(</a:t>
             </a:r>
             <a:r>
-              <a:rPr lang="en-US" sz="1800" b="0" dirty="0">
+              <a:rPr lang="en-US" sz="1600" b="0" dirty="0">
                 <a:solidFill>
                   <a:srgbClr val="098658"/>
                 </a:solidFill>
@@ -44612,7 +44591,7 @@
               <a:t>4</a:t>
             </a:r>
             <a:r>
-              <a:rPr lang="en-US" sz="1800" b="0" dirty="0">
+              <a:rPr lang="en-US" sz="1600" b="0" dirty="0">
                 <a:solidFill>
                   <a:srgbClr val="000000"/>
                 </a:solidFill>
@@ -44627,7 +44606,7 @@
               <a:buNone/>
             </a:pPr>
             <a:r>
-              <a:rPr lang="en-US" sz="1800" b="0" dirty="0">
+              <a:rPr lang="en-US" sz="1600" b="0" dirty="0">
                 <a:solidFill>
                   <a:srgbClr val="000000"/>
                 </a:solidFill>

</xml_diff>